<commit_message>
Added some more to debugging
</commit_message>
<xml_diff>
--- a/02_files/02 controlflow.pptx
+++ b/02_files/02 controlflow.pptx
@@ -5,10 +5,10 @@
     <p:sldMasterId id="2147483648" r:id="rId1"/>
   </p:sldMasterIdLst>
   <p:notesMasterIdLst>
-    <p:notesMasterId r:id="rId19"/>
+    <p:notesMasterId r:id="rId20"/>
   </p:notesMasterIdLst>
   <p:handoutMasterIdLst>
-    <p:handoutMasterId r:id="rId20"/>
+    <p:handoutMasterId r:id="rId21"/>
   </p:handoutMasterIdLst>
   <p:sldIdLst>
     <p:sldId id="256" r:id="rId2"/>
@@ -27,47 +27,48 @@
     <p:sldId id="292" r:id="rId15"/>
     <p:sldId id="280" r:id="rId16"/>
     <p:sldId id="293" r:id="rId17"/>
-    <p:sldId id="295" r:id="rId18"/>
+    <p:sldId id="296" r:id="rId18"/>
+    <p:sldId id="295" r:id="rId19"/>
   </p:sldIdLst>
   <p:sldSz cx="12188825" cy="6858000"/>
   <p:notesSz cx="6797675" cy="9926638"/>
   <p:embeddedFontLst>
     <p:embeddedFont>
       <p:font typeface="AU Passata" panose="020B0503030502030804" pitchFamily="34" charset="0"/>
-      <p:regular r:id="rId21"/>
-      <p:bold r:id="rId22"/>
+      <p:regular r:id="rId22"/>
+      <p:bold r:id="rId23"/>
     </p:embeddedFont>
     <p:embeddedFont>
       <p:font typeface="AU Passata Light" panose="020B0303030902030804" pitchFamily="34" charset="0"/>
-      <p:regular r:id="rId23"/>
-      <p:bold r:id="rId24"/>
+      <p:regular r:id="rId24"/>
+      <p:bold r:id="rId25"/>
     </p:embeddedFont>
     <p:embeddedFont>
       <p:font typeface="AU Peto" panose="040C0B07020602020301" pitchFamily="82" charset="0"/>
-      <p:regular r:id="rId25"/>
-      <p:bold r:id="rId26"/>
+      <p:regular r:id="rId26"/>
+      <p:bold r:id="rId27"/>
     </p:embeddedFont>
     <p:embeddedFont>
       <p:font typeface="Calibri" panose="020F0502020204030204" pitchFamily="34" charset="0"/>
-      <p:regular r:id="rId27"/>
-      <p:bold r:id="rId28"/>
-      <p:italic r:id="rId29"/>
-      <p:boldItalic r:id="rId30"/>
+      <p:regular r:id="rId28"/>
+      <p:bold r:id="rId29"/>
+      <p:italic r:id="rId30"/>
+      <p:boldItalic r:id="rId31"/>
     </p:embeddedFont>
     <p:embeddedFont>
       <p:font typeface="Georgia" panose="02040502050405020303" pitchFamily="18" charset="0"/>
-      <p:regular r:id="rId31"/>
-      <p:bold r:id="rId32"/>
-      <p:italic r:id="rId33"/>
-      <p:boldItalic r:id="rId34"/>
+      <p:regular r:id="rId32"/>
+      <p:bold r:id="rId33"/>
+      <p:italic r:id="rId34"/>
+      <p:boldItalic r:id="rId35"/>
     </p:embeddedFont>
     <p:embeddedFont>
       <p:font typeface="Lucida Console" panose="020B0609040504020204" pitchFamily="49" charset="0"/>
-      <p:regular r:id="rId35"/>
+      <p:regular r:id="rId36"/>
     </p:embeddedFont>
     <p:embeddedFont>
       <p:font typeface="Wingdings 3" panose="05040102010807070707" pitchFamily="18" charset="2"/>
-      <p:regular r:id="rId36"/>
+      <p:regular r:id="rId37"/>
     </p:embeddedFont>
   </p:embeddedFontLst>
   <p:defaultTextStyle>
@@ -1651,7 +1652,7 @@
             <a:fld id="{78417F83-4CBA-48F2-BAD0-783AE3701E32}" type="datetimeFigureOut">
               <a:rPr lang="en-GB" smtClean="0"/>
               <a:pPr/>
-              <a:t>20/11/2023</a:t>
+              <a:t>21/11/2023</a:t>
             </a:fld>
             <a:r>
               <a:rPr lang="en-GB" dirty="0"/>
@@ -1861,7 +1862,7 @@
             <a:fld id="{78417F83-4CBA-48F2-BAD0-783AE3701E32}" type="datetimeFigureOut">
               <a:rPr lang="en-GB" smtClean="0"/>
               <a:pPr/>
-              <a:t>20/11/2023</a:t>
+              <a:t>21/11/2023</a:t>
             </a:fld>
             <a:r>
               <a:rPr lang="en-GB" dirty="0"/>
@@ -2102,7 +2103,7 @@
             <a:fld id="{78417F83-4CBA-48F2-BAD0-783AE3701E32}" type="datetimeFigureOut">
               <a:rPr lang="en-GB" smtClean="0"/>
               <a:pPr/>
-              <a:t>20/11/2023</a:t>
+              <a:t>21/11/2023</a:t>
             </a:fld>
             <a:r>
               <a:rPr lang="en-GB" dirty="0"/>
@@ -2272,7 +2273,7 @@
             <a:fld id="{78417F83-4CBA-48F2-BAD0-783AE3701E32}" type="datetimeFigureOut">
               <a:rPr lang="en-GB" smtClean="0"/>
               <a:pPr/>
-              <a:t>20/11/2023</a:t>
+              <a:t>21/11/2023</a:t>
             </a:fld>
             <a:r>
               <a:rPr lang="en-GB" dirty="0"/>
@@ -2446,7 +2447,7 @@
             <a:fld id="{78417F83-4CBA-48F2-BAD0-783AE3701E32}" type="datetimeFigureOut">
               <a:rPr lang="en-GB" smtClean="0"/>
               <a:pPr/>
-              <a:t>20/11/2023</a:t>
+              <a:t>21/11/2023</a:t>
             </a:fld>
             <a:r>
               <a:rPr lang="en-GB" dirty="0"/>
@@ -2783,7 +2784,7 @@
             <a:fld id="{78417F83-4CBA-48F2-BAD0-783AE3701E32}" type="datetimeFigureOut">
               <a:rPr lang="en-GB" smtClean="0"/>
               <a:pPr/>
-              <a:t>20/11/2023</a:t>
+              <a:t>21/11/2023</a:t>
             </a:fld>
             <a:r>
               <a:rPr lang="en-GB" dirty="0"/>
@@ -2954,7 +2955,7 @@
             <a:fld id="{78417F83-4CBA-48F2-BAD0-783AE3701E32}" type="datetimeFigureOut">
               <a:rPr lang="en-GB" smtClean="0"/>
               <a:pPr/>
-              <a:t>20/11/2023</a:t>
+              <a:t>21/11/2023</a:t>
             </a:fld>
             <a:r>
               <a:rPr lang="en-GB" dirty="0"/>
@@ -3150,7 +3151,7 @@
             <a:fld id="{78417F83-4CBA-48F2-BAD0-783AE3701E32}" type="datetimeFigureOut">
               <a:rPr lang="en-GB" smtClean="0"/>
               <a:pPr/>
-              <a:t>20/11/2023</a:t>
+              <a:t>21/11/2023</a:t>
             </a:fld>
             <a:r>
               <a:rPr lang="en-GB" dirty="0"/>
@@ -3319,7 +3320,7 @@
             <a:fld id="{78417F83-4CBA-48F2-BAD0-783AE3701E32}" type="datetimeFigureOut">
               <a:rPr lang="en-GB" smtClean="0"/>
               <a:pPr/>
-              <a:t>20/11/2023</a:t>
+              <a:t>21/11/2023</a:t>
             </a:fld>
             <a:r>
               <a:rPr lang="en-GB" dirty="0"/>
@@ -3473,7 +3474,7 @@
             <a:fld id="{78417F83-4CBA-48F2-BAD0-783AE3701E32}" type="datetimeFigureOut">
               <a:rPr lang="en-GB" smtClean="0"/>
               <a:pPr/>
-              <a:t>20/11/2023</a:t>
+              <a:t>21/11/2023</a:t>
             </a:fld>
             <a:r>
               <a:rPr lang="en-GB" dirty="0"/>
@@ -4362,7 +4363,7 @@
             <a:fld id="{78417F83-4CBA-48F2-BAD0-783AE3701E32}" type="datetimeFigureOut">
               <a:rPr lang="en-GB" smtClean="0"/>
               <a:pPr/>
-              <a:t>20/11/2023</a:t>
+              <a:t>21/11/2023</a:t>
             </a:fld>
             <a:r>
               <a:rPr lang="en-GB" dirty="0"/>
@@ -5178,7 +5179,7 @@
             <a:fld id="{78417F83-4CBA-48F2-BAD0-783AE3701E32}" type="datetimeFigureOut">
               <a:rPr lang="en-GB" smtClean="0"/>
               <a:pPr/>
-              <a:t>20/11/2023</a:t>
+              <a:t>21/11/2023</a:t>
             </a:fld>
             <a:r>
               <a:rPr lang="en-GB" dirty="0"/>
@@ -5408,7 +5409,7 @@
             <a:fld id="{78417F83-4CBA-48F2-BAD0-783AE3701E32}" type="datetimeFigureOut">
               <a:rPr lang="en-GB" smtClean="0"/>
               <a:pPr/>
-              <a:t>20/11/2023</a:t>
+              <a:t>21/11/2023</a:t>
             </a:fld>
             <a:r>
               <a:rPr lang="en-GB" dirty="0"/>
@@ -5643,7 +5644,7 @@
           <a:p>
             <a:fld id="{3C2B07E4-CDF9-4C88-A2F3-04620E58224D}" type="datetimeFigureOut">
               <a:rPr lang="en-US" smtClean="0"/>
-              <a:t>11/20/2023</a:t>
+              <a:t>11/21/2023</a:t>
             </a:fld>
             <a:endParaRPr lang="en-US"/>
           </a:p>
@@ -6336,7 +6337,7 @@
             <a:fld id="{78417F83-4CBA-48F2-BAD0-783AE3701E32}" type="datetimeFigureOut">
               <a:rPr lang="en-GB" smtClean="0"/>
               <a:pPr/>
-              <a:t>20/11/2023</a:t>
+              <a:t>21/11/2023</a:t>
             </a:fld>
             <a:r>
               <a:rPr lang="en-GB" dirty="0"/>
@@ -6627,7 +6628,7 @@
             <a:fld id="{78417F83-4CBA-48F2-BAD0-783AE3701E32}" type="datetimeFigureOut">
               <a:rPr lang="en-GB" smtClean="0"/>
               <a:pPr/>
-              <a:t>20/11/2023</a:t>
+              <a:t>21/11/2023</a:t>
             </a:fld>
             <a:r>
               <a:rPr lang="en-GB" dirty="0"/>
@@ -7001,7 +7002,7 @@
             <a:fld id="{78417F83-4CBA-48F2-BAD0-783AE3701E32}" type="datetimeFigureOut">
               <a:rPr lang="en-GB" smtClean="0"/>
               <a:pPr/>
-              <a:t>20/11/2023</a:t>
+              <a:t>21/11/2023</a:t>
             </a:fld>
             <a:r>
               <a:rPr lang="en-GB" dirty="0"/>
@@ -7428,7 +7429,7 @@
             <a:fld id="{78417F83-4CBA-48F2-BAD0-783AE3701E32}" type="datetimeFigureOut">
               <a:rPr lang="en-GB" smtClean="0"/>
               <a:pPr/>
-              <a:t>20/11/2023</a:t>
+              <a:t>21/11/2023</a:t>
             </a:fld>
             <a:r>
               <a:rPr lang="en-GB" dirty="0"/>
@@ -7868,7 +7869,7 @@
             <a:fld id="{78417F83-4CBA-48F2-BAD0-783AE3701E32}" type="datetimeFigureOut">
               <a:rPr lang="en-GB" smtClean="0"/>
               <a:pPr/>
-              <a:t>20/11/2023</a:t>
+              <a:t>21/11/2023</a:t>
             </a:fld>
             <a:r>
               <a:rPr lang="en-GB" dirty="0"/>
@@ -8036,7 +8037,7 @@
             <a:fld id="{78417F83-4CBA-48F2-BAD0-783AE3701E32}" type="datetimeFigureOut">
               <a:rPr lang="en-GB" smtClean="0"/>
               <a:pPr/>
-              <a:t>20/11/2023</a:t>
+              <a:t>21/11/2023</a:t>
             </a:fld>
             <a:r>
               <a:rPr lang="en-GB" dirty="0"/>
@@ -8217,7 +8218,7 @@
             <a:fld id="{78417F83-4CBA-48F2-BAD0-783AE3701E32}" type="datetimeFigureOut">
               <a:rPr lang="en-GB" smtClean="0"/>
               <a:pPr/>
-              <a:t>20/11/2023</a:t>
+              <a:t>21/11/2023</a:t>
             </a:fld>
             <a:r>
               <a:rPr lang="en-GB" dirty="0"/>
@@ -8566,7 +8567,7 @@
                 </a:solidFill>
                 <a:latin typeface="+mn-lt"/>
               </a:rPr>
-              <a:t>Understanding R</a:t>
+              <a:t>Control flow and loops</a:t>
             </a:r>
           </a:p>
         </p:txBody>
@@ -8664,7 +8665,7 @@
                 </a:solidFill>
                 <a:latin typeface="+mn-lt"/>
               </a:rPr>
-              <a:t>7 November 2023</a:t>
+              <a:t>21 November 2023</a:t>
             </a:r>
           </a:p>
         </p:txBody>
@@ -8713,7 +8714,7 @@
                 </a:solidFill>
                 <a:latin typeface="+mn-lt"/>
               </a:rPr>
-              <a:t>Assistant Professor</a:t>
+              <a:t>Associate Professor</a:t>
             </a:r>
           </a:p>
         </p:txBody>
@@ -8989,7 +8990,7 @@
             <a:fld id="{78417F83-4CBA-48F2-BAD0-783AE3701E32}" type="datetimeFigureOut">
               <a:rPr lang="en-GB" smtClean="0"/>
               <a:pPr/>
-              <a:t>20/11/2023</a:t>
+              <a:t>21/11/2023</a:t>
             </a:fld>
             <a:r>
               <a:rPr lang="en-GB"/>
@@ -10104,7 +10105,7 @@
           <a:p>
             <a:fld id="{1462DDB0-5516-429B-8397-9D1992890718}" type="datetime1">
               <a:rPr lang="en-GB" smtClean="0"/>
-              <a:t>20/11/2023</a:t>
+              <a:t>21/11/2023</a:t>
             </a:fld>
             <a:r>
               <a:rPr lang="en-GB"/>
@@ -10311,7 +10312,7 @@
           <a:p>
             <a:fld id="{1462DDB0-5516-429B-8397-9D1992890718}" type="datetime1">
               <a:rPr lang="en-GB" smtClean="0"/>
-              <a:t>20/11/2023</a:t>
+              <a:t>21/11/2023</a:t>
             </a:fld>
             <a:r>
               <a:rPr lang="en-GB"/>
@@ -10997,7 +10998,7 @@
           <a:p>
             <a:fld id="{91539E5F-DD1A-46A4-8C1B-89E9A768A829}" type="datetime1">
               <a:rPr lang="en-GB" smtClean="0"/>
-              <a:t>20/11/2023</a:t>
+              <a:t>21/11/2023</a:t>
             </a:fld>
             <a:r>
               <a:rPr lang="en-GB"/>
@@ -11488,7 +11489,7 @@
           <a:p>
             <a:fld id="{91539E5F-DD1A-46A4-8C1B-89E9A768A829}" type="datetime1">
               <a:rPr lang="en-GB" smtClean="0"/>
-              <a:t>20/11/2023</a:t>
+              <a:t>21/11/2023</a:t>
             </a:fld>
             <a:r>
               <a:rPr lang="en-GB"/>
@@ -11862,7 +11863,7 @@
           <a:p>
             <a:fld id="{638DA670-DA22-4F3D-8A0F-EFE97634B4C8}" type="datetime1">
               <a:rPr lang="en-GB" smtClean="0"/>
-              <a:t>20/11/2023</a:t>
+              <a:t>21/11/2023</a:t>
             </a:fld>
             <a:r>
               <a:rPr lang="en-GB" dirty="0"/>
@@ -12419,7 +12420,7 @@
           <a:p>
             <a:fld id="{FB1A12EF-4D31-47C4-8B07-E3C83309B782}" type="datetime1">
               <a:rPr lang="en-GB" smtClean="0"/>
-              <a:t>20/11/2023</a:t>
+              <a:t>21/11/2023</a:t>
             </a:fld>
             <a:r>
               <a:rPr lang="en-GB"/>
@@ -12482,7 +12483,7 @@
           <a:p>
             <a:r>
               <a:rPr lang="en-US" sz="4400" dirty="0"/>
-              <a:t>Apply, like for loops, just with return</a:t>
+              <a:t>Apply, like for loops, but with storage</a:t>
             </a:r>
             <a:endParaRPr lang="da-DK" sz="4400" dirty="0"/>
           </a:p>
@@ -12506,60 +12507,118 @@
         </p:nvSpPr>
         <p:spPr>
           <a:xfrm>
-            <a:off x="985838" y="1373020"/>
-            <a:ext cx="10220325" cy="4936299"/>
+            <a:off x="985838" y="1373021"/>
+            <a:ext cx="10220325" cy="4360236"/>
           </a:xfrm>
         </p:spPr>
         <p:txBody>
           <a:bodyPr/>
           <a:lstStyle/>
           <a:p>
+            <a:pPr marL="342900" indent="-342900">
+              <a:buFont typeface="Arial" panose="020B0604020202020204" pitchFamily="34" charset="0"/>
+              <a:buChar char="•"/>
+            </a:pPr>
             <a:r>
               <a:rPr lang="en-US" dirty="0"/>
-              <a:t>apply(): Commonly used for operations on matrices like row or column sums.</a:t>
-            </a:r>
-          </a:p>
-          <a:p>
+              <a:t>A for loop to take the square root of all numbers from 1 to n</a:t>
+            </a:r>
+          </a:p>
+          <a:p>
+            <a:r>
+              <a:rPr lang="en-US" sz="1600" dirty="0">
+                <a:latin typeface="Lucida Console" panose="020B0609040504020204" pitchFamily="49" charset="0"/>
+              </a:rPr>
+              <a:t>result = numeric(length = n)</a:t>
+            </a:r>
+          </a:p>
+          <a:p>
+            <a:r>
+              <a:rPr lang="en-US" sz="1600" dirty="0">
+                <a:latin typeface="Lucida Console" panose="020B0609040504020204" pitchFamily="49" charset="0"/>
+              </a:rPr>
+              <a:t>for(</a:t>
+            </a:r>
+            <a:r>
+              <a:rPr lang="en-US" sz="1600" dirty="0" err="1">
+                <a:latin typeface="Lucida Console" panose="020B0609040504020204" pitchFamily="49" charset="0"/>
+              </a:rPr>
+              <a:t>i</a:t>
+            </a:r>
+            <a:r>
+              <a:rPr lang="en-US" sz="1600" dirty="0">
+                <a:latin typeface="Lucida Console" panose="020B0609040504020204" pitchFamily="49" charset="0"/>
+              </a:rPr>
+              <a:t> in 1:n) {</a:t>
+            </a:r>
+          </a:p>
+          <a:p>
+            <a:r>
+              <a:rPr lang="en-US" sz="1600" dirty="0">
+                <a:latin typeface="Lucida Console" panose="020B0609040504020204" pitchFamily="49" charset="0"/>
+              </a:rPr>
+              <a:t>  result[</a:t>
+            </a:r>
+            <a:r>
+              <a:rPr lang="en-US" sz="1600" dirty="0" err="1">
+                <a:latin typeface="Lucida Console" panose="020B0609040504020204" pitchFamily="49" charset="0"/>
+              </a:rPr>
+              <a:t>i</a:t>
+            </a:r>
+            <a:r>
+              <a:rPr lang="en-US" sz="1600" dirty="0">
+                <a:latin typeface="Lucida Console" panose="020B0609040504020204" pitchFamily="49" charset="0"/>
+              </a:rPr>
+              <a:t>] = sqrt(</a:t>
+            </a:r>
+            <a:r>
+              <a:rPr lang="en-US" sz="1600" dirty="0" err="1">
+                <a:latin typeface="Lucida Console" panose="020B0609040504020204" pitchFamily="49" charset="0"/>
+              </a:rPr>
+              <a:t>i</a:t>
+            </a:r>
+            <a:r>
+              <a:rPr lang="en-US" sz="1600" dirty="0">
+                <a:latin typeface="Lucida Console" panose="020B0609040504020204" pitchFamily="49" charset="0"/>
+              </a:rPr>
+              <a:t>)</a:t>
+            </a:r>
+          </a:p>
+          <a:p>
+            <a:r>
+              <a:rPr lang="en-US" sz="1600" dirty="0">
+                <a:latin typeface="Lucida Console" panose="020B0609040504020204" pitchFamily="49" charset="0"/>
+              </a:rPr>
+              <a:t>}</a:t>
+            </a:r>
+          </a:p>
+          <a:p>
+            <a:endParaRPr lang="en-US" dirty="0"/>
+          </a:p>
+          <a:p>
+            <a:pPr marL="342900" indent="-342900">
+              <a:buFont typeface="Arial" panose="020B0604020202020204" pitchFamily="34" charset="0"/>
+              <a:buChar char="•"/>
+            </a:pPr>
             <a:r>
               <a:rPr lang="en-US" dirty="0"/>
-              <a:t>Example: </a:t>
-            </a:r>
-            <a:r>
-              <a:rPr lang="en-US" sz="1600" dirty="0" err="1">
-                <a:latin typeface="Lucida Console" panose="020B0609040504020204" pitchFamily="49" charset="0"/>
-              </a:rPr>
-              <a:t>geneData</a:t>
-            </a:r>
-            <a:r>
-              <a:rPr lang="en-US" sz="1600" dirty="0">
-                <a:latin typeface="Lucida Console" panose="020B0609040504020204" pitchFamily="49" charset="0"/>
-              </a:rPr>
-              <a:t> %&gt;% apply(1, var, na.rm = TRUE)</a:t>
-            </a:r>
-          </a:p>
-          <a:p>
-            <a:endParaRPr lang="en-US" dirty="0"/>
-          </a:p>
-          <a:p>
+              <a:t>Equivalent </a:t>
+            </a:r>
             <a:r>
               <a:rPr lang="en-US" dirty="0" err="1"/>
               <a:t>sapply</a:t>
             </a:r>
             <a:r>
               <a:rPr lang="en-US" dirty="0"/>
-              <a:t>() (simplify apply): When you expect the output to be of a simpler structure.</a:t>
-            </a:r>
-          </a:p>
-          <a:p>
-            <a:r>
-              <a:rPr lang="en-US" dirty="0"/>
-              <a:t>Example: </a:t>
-            </a:r>
+              <a:t>:</a:t>
+            </a:r>
+          </a:p>
+          <a:p>
             <a:r>
               <a:rPr lang="en-US" sz="1600" dirty="0">
                 <a:latin typeface="Lucida Console" panose="020B0609040504020204" pitchFamily="49" charset="0"/>
               </a:rPr>
-              <a:t>1:10 %&gt;% </a:t>
+              <a:t>result = </a:t>
             </a:r>
             <a:r>
               <a:rPr lang="en-US" sz="1600" dirty="0" err="1">
@@ -12571,118 +12630,83 @@
               <a:rPr lang="en-US" sz="1600" dirty="0">
                 <a:latin typeface="Lucida Console" panose="020B0609040504020204" pitchFamily="49" charset="0"/>
               </a:rPr>
-              <a:t>(sqrt)</a:t>
-            </a:r>
-          </a:p>
-          <a:p>
-            <a:endParaRPr lang="en-US" dirty="0"/>
-          </a:p>
-          <a:p>
-            <a:r>
-              <a:rPr lang="en-US" dirty="0" err="1"/>
-              <a:t>lapply</a:t>
-            </a:r>
-            <a:r>
-              <a:rPr lang="en-US" dirty="0"/>
-              <a:t>() (list apply): Same as </a:t>
-            </a:r>
-            <a:r>
-              <a:rPr lang="en-US" dirty="0" err="1"/>
+              <a:t>(1:n, sqrt)</a:t>
+            </a:r>
+          </a:p>
+          <a:p>
+            <a:endParaRPr lang="en-US" sz="1600" dirty="0">
+              <a:latin typeface="Lucida Console" panose="020B0609040504020204" pitchFamily="49" charset="0"/>
+            </a:endParaRPr>
+          </a:p>
+          <a:p>
+            <a:r>
+              <a:rPr lang="en-US" sz="1600" dirty="0">
+                <a:latin typeface="Lucida Console" panose="020B0609040504020204" pitchFamily="49" charset="0"/>
+              </a:rPr>
+              <a:t>result = </a:t>
+            </a:r>
+            <a:r>
+              <a:rPr lang="en-US" sz="1600" dirty="0" err="1">
+                <a:latin typeface="Lucida Console" panose="020B0609040504020204" pitchFamily="49" charset="0"/>
+              </a:rPr>
               <a:t>sapply</a:t>
             </a:r>
             <a:r>
-              <a:rPr lang="en-US" dirty="0"/>
-              <a:t>, but you want the output as a list</a:t>
-            </a:r>
-          </a:p>
-          <a:p>
-            <a:r>
-              <a:rPr lang="en-US" dirty="0"/>
-              <a:t>Example: </a:t>
-            </a:r>
-            <a:r>
               <a:rPr lang="en-US" sz="1600" dirty="0">
                 <a:latin typeface="Lucida Console" panose="020B0609040504020204" pitchFamily="49" charset="0"/>
               </a:rPr>
-              <a:t>1:10 %&gt;% </a:t>
+              <a:t>(1:n, function(</a:t>
             </a:r>
             <a:r>
               <a:rPr lang="en-US" sz="1600" dirty="0" err="1">
                 <a:latin typeface="Lucida Console" panose="020B0609040504020204" pitchFamily="49" charset="0"/>
               </a:rPr>
-              <a:t>lapply</a:t>
+              <a:t>i</a:t>
             </a:r>
             <a:r>
               <a:rPr lang="en-US" sz="1600" dirty="0">
                 <a:latin typeface="Lucida Console" panose="020B0609040504020204" pitchFamily="49" charset="0"/>
               </a:rPr>
-              <a:t>(sqrt)</a:t>
-            </a:r>
-          </a:p>
-          <a:p>
-            <a:endParaRPr lang="en-US" dirty="0"/>
-          </a:p>
-          <a:p>
-            <a:r>
-              <a:rPr lang="en-US" dirty="0" err="1"/>
-              <a:t>mapply</a:t>
-            </a:r>
-            <a:r>
-              <a:rPr lang="en-US" dirty="0"/>
-              <a:t>() (multivariate apply): When you need additional arguments passed</a:t>
-            </a:r>
-          </a:p>
-          <a:p>
-            <a:r>
-              <a:rPr lang="en-US" dirty="0"/>
-              <a:t>Example: </a:t>
+              <a:t>) {</a:t>
+            </a:r>
+          </a:p>
+          <a:p>
+            <a:r>
+              <a:rPr lang="en-US" sz="1600" dirty="0">
+                <a:latin typeface="Lucida Console" panose="020B0609040504020204" pitchFamily="49" charset="0"/>
+              </a:rPr>
+              <a:t>  sqrt(</a:t>
             </a:r>
             <a:r>
               <a:rPr lang="en-US" sz="1600" dirty="0" err="1">
                 <a:latin typeface="Lucida Console" panose="020B0609040504020204" pitchFamily="49" charset="0"/>
               </a:rPr>
-              <a:t>mapply</a:t>
+              <a:t>i</a:t>
             </a:r>
             <a:r>
               <a:rPr lang="en-US" sz="1600" dirty="0">
                 <a:latin typeface="Lucida Console" panose="020B0609040504020204" pitchFamily="49" charset="0"/>
               </a:rPr>
-              <a:t>(rep, times = 1:10, x = 1:5, each = 2)</a:t>
-            </a:r>
-          </a:p>
-          <a:p>
-            <a:pPr>
-              <a:buNone/>
-            </a:pPr>
-            <a:endParaRPr lang="en-US" dirty="0"/>
-          </a:p>
-          <a:p>
-            <a:pPr>
-              <a:buNone/>
-            </a:pPr>
-            <a:r>
-              <a:rPr lang="en-US" dirty="0"/>
-              <a:t>Others: </a:t>
-            </a:r>
-            <a:r>
-              <a:rPr lang="en-US" dirty="0" err="1"/>
-              <a:t>vapply</a:t>
-            </a:r>
-            <a:r>
-              <a:rPr lang="en-US" dirty="0"/>
-              <a:t> (when you need a specific type return), </a:t>
-            </a:r>
-            <a:r>
-              <a:rPr lang="en-US" dirty="0" err="1"/>
-              <a:t>tapply</a:t>
-            </a:r>
-            <a:r>
-              <a:rPr lang="en-US" dirty="0"/>
-              <a:t> (something with factors)</a:t>
-            </a:r>
-          </a:p>
-          <a:p>
-            <a:endParaRPr lang="en-US" dirty="0"/>
+              <a:t>)</a:t>
+            </a:r>
+          </a:p>
+          <a:p>
+            <a:r>
+              <a:rPr lang="en-US" sz="1600" dirty="0">
+                <a:latin typeface="Lucida Console" panose="020B0609040504020204" pitchFamily="49" charset="0"/>
+              </a:rPr>
+              <a:t>})</a:t>
+            </a:r>
+          </a:p>
+          <a:p>
+            <a:endParaRPr lang="en-US" sz="1600" dirty="0">
+              <a:latin typeface="Lucida Console" panose="020B0609040504020204" pitchFamily="49" charset="0"/>
+            </a:endParaRPr>
+          </a:p>
+          <a:p>
+            <a:endParaRPr lang="en-US" sz="1600" dirty="0">
+              <a:latin typeface="Lucida Console" panose="020B0609040504020204" pitchFamily="49" charset="0"/>
+            </a:endParaRPr>
           </a:p>
         </p:txBody>
       </p:sp>
@@ -12709,13 +12733,208 @@
           <a:p>
             <a:fld id="{527D860E-4AA8-43CC-B3E9-353006A6F547}" type="datetime1">
               <a:rPr lang="en-GB" smtClean="0"/>
-              <a:t>20/11/2023</a:t>
+              <a:t>21/11/2023</a:t>
             </a:fld>
             <a:r>
               <a:rPr lang="en-GB"/>
               <a:t>07/11/2023</a:t>
             </a:r>
             <a:endParaRPr lang="en-GB" dirty="0"/>
+          </a:p>
+        </p:txBody>
+      </p:sp>
+      <p:sp>
+        <p:nvSpPr>
+          <p:cNvPr id="5" name="TextBox 4">
+            <a:extLst>
+              <a:ext uri="{FF2B5EF4-FFF2-40B4-BE49-F238E27FC236}">
+                <a16:creationId xmlns:a16="http://schemas.microsoft.com/office/drawing/2014/main" id="{612D7AB2-B051-7C05-C6B4-1822254C470E}"/>
+              </a:ext>
+            </a:extLst>
+          </p:cNvPr>
+          <p:cNvSpPr txBox="1"/>
+          <p:nvPr/>
+        </p:nvSpPr>
+        <p:spPr>
+          <a:xfrm>
+            <a:off x="6310436" y="3424954"/>
+            <a:ext cx="5472608" cy="1929759"/>
+          </a:xfrm>
+          <a:prstGeom prst="rect">
+            <a:avLst/>
+          </a:prstGeom>
+          <a:noFill/>
+        </p:spPr>
+        <p:txBody>
+          <a:bodyPr wrap="square" lIns="0" tIns="0" rIns="0" bIns="0" rtlCol="0">
+            <a:spAutoFit/>
+          </a:bodyPr>
+          <a:lstStyle/>
+          <a:p>
+            <a:pPr marL="285750" indent="-285750">
+              <a:lnSpc>
+                <a:spcPct val="95000"/>
+              </a:lnSpc>
+              <a:buFont typeface="Arial" panose="020B0604020202020204" pitchFamily="34" charset="0"/>
+              <a:buChar char="•"/>
+            </a:pPr>
+            <a:r>
+              <a:rPr lang="en-US" sz="2000" dirty="0">
+                <a:latin typeface="+mn-lt"/>
+              </a:rPr>
+              <a:t>Remember &lt;&lt;- scopes to global environment</a:t>
+            </a:r>
+          </a:p>
+          <a:p>
+            <a:pPr>
+              <a:lnSpc>
+                <a:spcPct val="95000"/>
+              </a:lnSpc>
+            </a:pPr>
+            <a:r>
+              <a:rPr lang="en-US" sz="1600" dirty="0">
+                <a:latin typeface="Lucida Console" panose="020B0609040504020204" pitchFamily="49" charset="0"/>
+              </a:rPr>
+              <a:t>result = numeric(length = n)</a:t>
+            </a:r>
+          </a:p>
+          <a:p>
+            <a:pPr>
+              <a:lnSpc>
+                <a:spcPct val="95000"/>
+              </a:lnSpc>
+            </a:pPr>
+            <a:endParaRPr lang="en-US" sz="1600" dirty="0">
+              <a:latin typeface="Lucida Console" panose="020B0609040504020204" pitchFamily="49" charset="0"/>
+            </a:endParaRPr>
+          </a:p>
+          <a:p>
+            <a:pPr>
+              <a:lnSpc>
+                <a:spcPct val="95000"/>
+              </a:lnSpc>
+            </a:pPr>
+            <a:r>
+              <a:rPr lang="en-US" sz="1600" dirty="0">
+                <a:latin typeface="Lucida Console" panose="020B0609040504020204" pitchFamily="49" charset="0"/>
+              </a:rPr>
+              <a:t>result2 = </a:t>
+            </a:r>
+            <a:r>
+              <a:rPr lang="en-US" sz="1600" dirty="0" err="1">
+                <a:latin typeface="Lucida Console" panose="020B0609040504020204" pitchFamily="49" charset="0"/>
+              </a:rPr>
+              <a:t>sapply</a:t>
+            </a:r>
+            <a:r>
+              <a:rPr lang="en-US" sz="1600" dirty="0">
+                <a:latin typeface="Lucida Console" panose="020B0609040504020204" pitchFamily="49" charset="0"/>
+              </a:rPr>
+              <a:t>(1:n, function(</a:t>
+            </a:r>
+            <a:r>
+              <a:rPr lang="en-US" sz="1600" dirty="0" err="1">
+                <a:latin typeface="Lucida Console" panose="020B0609040504020204" pitchFamily="49" charset="0"/>
+              </a:rPr>
+              <a:t>i</a:t>
+            </a:r>
+            <a:r>
+              <a:rPr lang="en-US" sz="1600" dirty="0">
+                <a:latin typeface="Lucida Console" panose="020B0609040504020204" pitchFamily="49" charset="0"/>
+              </a:rPr>
+              <a:t>) {</a:t>
+            </a:r>
+          </a:p>
+          <a:p>
+            <a:pPr>
+              <a:lnSpc>
+                <a:spcPct val="95000"/>
+              </a:lnSpc>
+            </a:pPr>
+            <a:r>
+              <a:rPr lang="en-US" sz="1600" dirty="0">
+                <a:latin typeface="Lucida Console" panose="020B0609040504020204" pitchFamily="49" charset="0"/>
+              </a:rPr>
+              <a:t>  result[</a:t>
+            </a:r>
+            <a:r>
+              <a:rPr lang="en-US" sz="1600" dirty="0" err="1">
+                <a:latin typeface="Lucida Console" panose="020B0609040504020204" pitchFamily="49" charset="0"/>
+              </a:rPr>
+              <a:t>i</a:t>
+            </a:r>
+            <a:r>
+              <a:rPr lang="en-US" sz="1600" dirty="0">
+                <a:latin typeface="Lucida Console" panose="020B0609040504020204" pitchFamily="49" charset="0"/>
+              </a:rPr>
+              <a:t>] &lt;&lt;- sqrt(</a:t>
+            </a:r>
+            <a:r>
+              <a:rPr lang="en-US" sz="1600" dirty="0" err="1">
+                <a:latin typeface="Lucida Console" panose="020B0609040504020204" pitchFamily="49" charset="0"/>
+              </a:rPr>
+              <a:t>i</a:t>
+            </a:r>
+            <a:r>
+              <a:rPr lang="en-US" sz="1600" dirty="0">
+                <a:latin typeface="Lucida Console" panose="020B0609040504020204" pitchFamily="49" charset="0"/>
+              </a:rPr>
+              <a:t>)</a:t>
+            </a:r>
+          </a:p>
+          <a:p>
+            <a:pPr>
+              <a:lnSpc>
+                <a:spcPct val="95000"/>
+              </a:lnSpc>
+            </a:pPr>
+            <a:r>
+              <a:rPr lang="en-US" sz="1600" dirty="0">
+                <a:latin typeface="Lucida Console" panose="020B0609040504020204" pitchFamily="49" charset="0"/>
+              </a:rPr>
+              <a:t>  </a:t>
+            </a:r>
+          </a:p>
+          <a:p>
+            <a:pPr>
+              <a:lnSpc>
+                <a:spcPct val="95000"/>
+              </a:lnSpc>
+            </a:pPr>
+            <a:r>
+              <a:rPr lang="en-US" sz="1600" dirty="0">
+                <a:latin typeface="Lucida Console" panose="020B0609040504020204" pitchFamily="49" charset="0"/>
+              </a:rPr>
+              <a:t>  return(sqrt(</a:t>
+            </a:r>
+            <a:r>
+              <a:rPr lang="en-US" sz="1600" dirty="0" err="1">
+                <a:latin typeface="Lucida Console" panose="020B0609040504020204" pitchFamily="49" charset="0"/>
+              </a:rPr>
+              <a:t>i</a:t>
+            </a:r>
+            <a:r>
+              <a:rPr lang="en-US" sz="1600" dirty="0">
+                <a:latin typeface="Lucida Console" panose="020B0609040504020204" pitchFamily="49" charset="0"/>
+              </a:rPr>
+              <a:t>)^2)</a:t>
+            </a:r>
+          </a:p>
+          <a:p>
+            <a:pPr>
+              <a:lnSpc>
+                <a:spcPct val="95000"/>
+              </a:lnSpc>
+            </a:pPr>
+            <a:r>
+              <a:rPr lang="en-US" sz="1600" dirty="0">
+                <a:latin typeface="Lucida Console" panose="020B0609040504020204" pitchFamily="49" charset="0"/>
+              </a:rPr>
+              <a:t>})</a:t>
+            </a:r>
+            <a:endParaRPr lang="da-DK" sz="1600" dirty="0">
+              <a:latin typeface="Lucida Console" panose="020B0609040504020204" pitchFamily="49" charset="0"/>
+            </a:endParaRPr>
           </a:p>
         </p:txBody>
       </p:sp>
@@ -12729,6 +12948,275 @@
   <p:clrMapOvr>
     <a:masterClrMapping/>
   </p:clrMapOvr>
+  <p:timing>
+    <p:tnLst>
+      <p:par>
+        <p:cTn id="1" dur="indefinite" restart="never" nodeType="tmRoot">
+          <p:childTnLst>
+            <p:seq concurrent="1" nextAc="seek">
+              <p:cTn id="2" dur="indefinite" nodeType="mainSeq">
+                <p:childTnLst>
+                  <p:par>
+                    <p:cTn id="3" fill="hold">
+                      <p:stCondLst>
+                        <p:cond delay="indefinite"/>
+                      </p:stCondLst>
+                      <p:childTnLst>
+                        <p:par>
+                          <p:cTn id="4" fill="hold">
+                            <p:stCondLst>
+                              <p:cond delay="0"/>
+                            </p:stCondLst>
+                            <p:childTnLst>
+                              <p:par>
+                                <p:cTn id="5" presetID="1" presetClass="entr" presetSubtype="0" fill="hold" nodeType="clickEffect">
+                                  <p:stCondLst>
+                                    <p:cond delay="0"/>
+                                  </p:stCondLst>
+                                  <p:childTnLst>
+                                    <p:set>
+                                      <p:cBhvr>
+                                        <p:cTn id="6" dur="1" fill="hold">
+                                          <p:stCondLst>
+                                            <p:cond delay="0"/>
+                                          </p:stCondLst>
+                                        </p:cTn>
+                                        <p:tgtEl>
+                                          <p:spTgt spid="3">
+                                            <p:txEl>
+                                              <p:pRg st="6" end="6"/>
+                                            </p:txEl>
+                                          </p:spTgt>
+                                        </p:tgtEl>
+                                        <p:attrNameLst>
+                                          <p:attrName>style.visibility</p:attrName>
+                                        </p:attrNameLst>
+                                      </p:cBhvr>
+                                      <p:to>
+                                        <p:strVal val="visible"/>
+                                      </p:to>
+                                    </p:set>
+                                  </p:childTnLst>
+                                </p:cTn>
+                              </p:par>
+                              <p:par>
+                                <p:cTn id="7" presetID="1" presetClass="entr" presetSubtype="0" fill="hold" nodeType="withEffect">
+                                  <p:stCondLst>
+                                    <p:cond delay="0"/>
+                                  </p:stCondLst>
+                                  <p:childTnLst>
+                                    <p:set>
+                                      <p:cBhvr>
+                                        <p:cTn id="8" dur="1" fill="hold">
+                                          <p:stCondLst>
+                                            <p:cond delay="0"/>
+                                          </p:stCondLst>
+                                        </p:cTn>
+                                        <p:tgtEl>
+                                          <p:spTgt spid="3">
+                                            <p:txEl>
+                                              <p:pRg st="7" end="7"/>
+                                            </p:txEl>
+                                          </p:spTgt>
+                                        </p:tgtEl>
+                                        <p:attrNameLst>
+                                          <p:attrName>style.visibility</p:attrName>
+                                        </p:attrNameLst>
+                                      </p:cBhvr>
+                                      <p:to>
+                                        <p:strVal val="visible"/>
+                                      </p:to>
+                                    </p:set>
+                                  </p:childTnLst>
+                                </p:cTn>
+                              </p:par>
+                            </p:childTnLst>
+                          </p:cTn>
+                        </p:par>
+                      </p:childTnLst>
+                    </p:cTn>
+                  </p:par>
+                  <p:par>
+                    <p:cTn id="9" fill="hold">
+                      <p:stCondLst>
+                        <p:cond delay="indefinite"/>
+                      </p:stCondLst>
+                      <p:childTnLst>
+                        <p:par>
+                          <p:cTn id="10" fill="hold">
+                            <p:stCondLst>
+                              <p:cond delay="0"/>
+                            </p:stCondLst>
+                            <p:childTnLst>
+                              <p:par>
+                                <p:cTn id="11" presetID="1" presetClass="entr" presetSubtype="0" fill="hold" nodeType="clickEffect">
+                                  <p:stCondLst>
+                                    <p:cond delay="0"/>
+                                  </p:stCondLst>
+                                  <p:childTnLst>
+                                    <p:set>
+                                      <p:cBhvr>
+                                        <p:cTn id="12" dur="1" fill="hold">
+                                          <p:stCondLst>
+                                            <p:cond delay="0"/>
+                                          </p:stCondLst>
+                                        </p:cTn>
+                                        <p:tgtEl>
+                                          <p:spTgt spid="3">
+                                            <p:txEl>
+                                              <p:pRg st="9" end="9"/>
+                                            </p:txEl>
+                                          </p:spTgt>
+                                        </p:tgtEl>
+                                        <p:attrNameLst>
+                                          <p:attrName>style.visibility</p:attrName>
+                                        </p:attrNameLst>
+                                      </p:cBhvr>
+                                      <p:to>
+                                        <p:strVal val="visible"/>
+                                      </p:to>
+                                    </p:set>
+                                  </p:childTnLst>
+                                </p:cTn>
+                              </p:par>
+                              <p:par>
+                                <p:cTn id="13" presetID="1" presetClass="entr" presetSubtype="0" fill="hold" nodeType="withEffect">
+                                  <p:stCondLst>
+                                    <p:cond delay="0"/>
+                                  </p:stCondLst>
+                                  <p:childTnLst>
+                                    <p:set>
+                                      <p:cBhvr>
+                                        <p:cTn id="14" dur="1" fill="hold">
+                                          <p:stCondLst>
+                                            <p:cond delay="0"/>
+                                          </p:stCondLst>
+                                        </p:cTn>
+                                        <p:tgtEl>
+                                          <p:spTgt spid="3">
+                                            <p:txEl>
+                                              <p:pRg st="10" end="10"/>
+                                            </p:txEl>
+                                          </p:spTgt>
+                                        </p:tgtEl>
+                                        <p:attrNameLst>
+                                          <p:attrName>style.visibility</p:attrName>
+                                        </p:attrNameLst>
+                                      </p:cBhvr>
+                                      <p:to>
+                                        <p:strVal val="visible"/>
+                                      </p:to>
+                                    </p:set>
+                                  </p:childTnLst>
+                                </p:cTn>
+                              </p:par>
+                              <p:par>
+                                <p:cTn id="15" presetID="1" presetClass="entr" presetSubtype="0" fill="hold" nodeType="withEffect">
+                                  <p:stCondLst>
+                                    <p:cond delay="0"/>
+                                  </p:stCondLst>
+                                  <p:childTnLst>
+                                    <p:set>
+                                      <p:cBhvr>
+                                        <p:cTn id="16" dur="1" fill="hold">
+                                          <p:stCondLst>
+                                            <p:cond delay="0"/>
+                                          </p:stCondLst>
+                                        </p:cTn>
+                                        <p:tgtEl>
+                                          <p:spTgt spid="3">
+                                            <p:txEl>
+                                              <p:pRg st="11" end="11"/>
+                                            </p:txEl>
+                                          </p:spTgt>
+                                        </p:tgtEl>
+                                        <p:attrNameLst>
+                                          <p:attrName>style.visibility</p:attrName>
+                                        </p:attrNameLst>
+                                      </p:cBhvr>
+                                      <p:to>
+                                        <p:strVal val="visible"/>
+                                      </p:to>
+                                    </p:set>
+                                  </p:childTnLst>
+                                </p:cTn>
+                              </p:par>
+                            </p:childTnLst>
+                          </p:cTn>
+                        </p:par>
+                      </p:childTnLst>
+                    </p:cTn>
+                  </p:par>
+                  <p:par>
+                    <p:cTn id="17" fill="hold">
+                      <p:stCondLst>
+                        <p:cond delay="indefinite"/>
+                      </p:stCondLst>
+                      <p:childTnLst>
+                        <p:par>
+                          <p:cTn id="18" fill="hold">
+                            <p:stCondLst>
+                              <p:cond delay="0"/>
+                            </p:stCondLst>
+                            <p:childTnLst>
+                              <p:par>
+                                <p:cTn id="19" presetID="1" presetClass="entr" presetSubtype="0" fill="hold" grpId="0" nodeType="clickEffect">
+                                  <p:stCondLst>
+                                    <p:cond delay="0"/>
+                                  </p:stCondLst>
+                                  <p:childTnLst>
+                                    <p:set>
+                                      <p:cBhvr>
+                                        <p:cTn id="20" dur="1" fill="hold">
+                                          <p:stCondLst>
+                                            <p:cond delay="0"/>
+                                          </p:stCondLst>
+                                        </p:cTn>
+                                        <p:tgtEl>
+                                          <p:spTgt spid="5"/>
+                                        </p:tgtEl>
+                                        <p:attrNameLst>
+                                          <p:attrName>style.visibility</p:attrName>
+                                        </p:attrNameLst>
+                                      </p:cBhvr>
+                                      <p:to>
+                                        <p:strVal val="visible"/>
+                                      </p:to>
+                                    </p:set>
+                                  </p:childTnLst>
+                                </p:cTn>
+                              </p:par>
+                            </p:childTnLst>
+                          </p:cTn>
+                        </p:par>
+                      </p:childTnLst>
+                    </p:cTn>
+                  </p:par>
+                </p:childTnLst>
+              </p:cTn>
+              <p:prevCondLst>
+                <p:cond evt="onPrev" delay="0">
+                  <p:tgtEl>
+                    <p:sldTgt/>
+                  </p:tgtEl>
+                </p:cond>
+              </p:prevCondLst>
+              <p:nextCondLst>
+                <p:cond evt="onNext" delay="0">
+                  <p:tgtEl>
+                    <p:sldTgt/>
+                  </p:tgtEl>
+                </p:cond>
+              </p:nextCondLst>
+            </p:seq>
+          </p:childTnLst>
+        </p:cTn>
+      </p:par>
+    </p:tnLst>
+    <p:bldLst>
+      <p:bldP spid="5" grpId="0"/>
+    </p:bldLst>
+  </p:timing>
 </p:sld>
 </file>
 
@@ -12754,6 +13242,601 @@
           <p:cNvPr id="2" name="Title 1">
             <a:extLst>
               <a:ext uri="{FF2B5EF4-FFF2-40B4-BE49-F238E27FC236}">
+                <a16:creationId xmlns:a16="http://schemas.microsoft.com/office/drawing/2014/main" id="{2B334D21-32D1-77BA-14E8-C7B42DD98B6F}"/>
+              </a:ext>
+            </a:extLst>
+          </p:cNvPr>
+          <p:cNvSpPr>
+            <a:spLocks noGrp="1"/>
+          </p:cNvSpPr>
+          <p:nvPr>
+            <p:ph type="title"/>
+          </p:nvPr>
+        </p:nvSpPr>
+        <p:spPr/>
+        <p:txBody>
+          <a:bodyPr/>
+          <a:lstStyle/>
+          <a:p>
+            <a:r>
+              <a:rPr lang="en-US" sz="4400" dirty="0"/>
+              <a:t>All the </a:t>
+            </a:r>
+            <a:r>
+              <a:rPr lang="en-US" sz="4400" dirty="0" err="1"/>
+              <a:t>applys</a:t>
+            </a:r>
+            <a:endParaRPr lang="da-DK" sz="4400" dirty="0"/>
+          </a:p>
+        </p:txBody>
+      </p:sp>
+      <p:sp>
+        <p:nvSpPr>
+          <p:cNvPr id="3" name="Content Placeholder 2">
+            <a:extLst>
+              <a:ext uri="{FF2B5EF4-FFF2-40B4-BE49-F238E27FC236}">
+                <a16:creationId xmlns:a16="http://schemas.microsoft.com/office/drawing/2014/main" id="{3F004C56-91F6-D599-F464-2C4C8D22CF01}"/>
+              </a:ext>
+            </a:extLst>
+          </p:cNvPr>
+          <p:cNvSpPr>
+            <a:spLocks noGrp="1"/>
+          </p:cNvSpPr>
+          <p:nvPr>
+            <p:ph idx="1"/>
+          </p:nvPr>
+        </p:nvSpPr>
+        <p:spPr>
+          <a:xfrm>
+            <a:off x="985838" y="1373020"/>
+            <a:ext cx="10220325" cy="4936299"/>
+          </a:xfrm>
+        </p:spPr>
+        <p:txBody>
+          <a:bodyPr/>
+          <a:lstStyle/>
+          <a:p>
+            <a:r>
+              <a:rPr lang="en-US" dirty="0"/>
+              <a:t>apply(): Used for operations on matrices/data frames like row or column sums.</a:t>
+            </a:r>
+          </a:p>
+          <a:p>
+            <a:r>
+              <a:rPr lang="en-US" dirty="0"/>
+              <a:t>Example: </a:t>
+            </a:r>
+            <a:r>
+              <a:rPr lang="en-US" sz="1600" dirty="0" err="1">
+                <a:latin typeface="Lucida Console" panose="020B0609040504020204" pitchFamily="49" charset="0"/>
+              </a:rPr>
+              <a:t>geneData</a:t>
+            </a:r>
+            <a:r>
+              <a:rPr lang="en-US" sz="1600" dirty="0">
+                <a:latin typeface="Lucida Console" panose="020B0609040504020204" pitchFamily="49" charset="0"/>
+              </a:rPr>
+              <a:t> %&gt;% apply(1, var, na.rm = TRUE)</a:t>
+            </a:r>
+          </a:p>
+          <a:p>
+            <a:endParaRPr lang="en-US" dirty="0"/>
+          </a:p>
+          <a:p>
+            <a:r>
+              <a:rPr lang="en-US" dirty="0" err="1"/>
+              <a:t>sapply</a:t>
+            </a:r>
+            <a:r>
+              <a:rPr lang="en-US" dirty="0"/>
+              <a:t>() (simplify apply): When you expect the output to be of a simpler structure.</a:t>
+            </a:r>
+          </a:p>
+          <a:p>
+            <a:r>
+              <a:rPr lang="en-US" dirty="0"/>
+              <a:t>Example: </a:t>
+            </a:r>
+            <a:r>
+              <a:rPr lang="en-US" sz="1600" dirty="0">
+                <a:latin typeface="Lucida Console" panose="020B0609040504020204" pitchFamily="49" charset="0"/>
+              </a:rPr>
+              <a:t>1:10 %&gt;% </a:t>
+            </a:r>
+            <a:r>
+              <a:rPr lang="en-US" sz="1600" dirty="0" err="1">
+                <a:latin typeface="Lucida Console" panose="020B0609040504020204" pitchFamily="49" charset="0"/>
+              </a:rPr>
+              <a:t>sapply</a:t>
+            </a:r>
+            <a:r>
+              <a:rPr lang="en-US" sz="1600" dirty="0">
+                <a:latin typeface="Lucida Console" panose="020B0609040504020204" pitchFamily="49" charset="0"/>
+              </a:rPr>
+              <a:t>(sqrt)</a:t>
+            </a:r>
+          </a:p>
+          <a:p>
+            <a:endParaRPr lang="en-US" dirty="0"/>
+          </a:p>
+          <a:p>
+            <a:r>
+              <a:rPr lang="en-US" dirty="0" err="1"/>
+              <a:t>lapply</a:t>
+            </a:r>
+            <a:r>
+              <a:rPr lang="en-US" dirty="0"/>
+              <a:t>() (list apply): Same as </a:t>
+            </a:r>
+            <a:r>
+              <a:rPr lang="en-US" dirty="0" err="1"/>
+              <a:t>sapply</a:t>
+            </a:r>
+            <a:r>
+              <a:rPr lang="en-US" dirty="0"/>
+              <a:t>, but you want the output as a list</a:t>
+            </a:r>
+          </a:p>
+          <a:p>
+            <a:r>
+              <a:rPr lang="en-US" dirty="0"/>
+              <a:t>Example: </a:t>
+            </a:r>
+            <a:r>
+              <a:rPr lang="en-US" sz="1600" dirty="0">
+                <a:latin typeface="Lucida Console" panose="020B0609040504020204" pitchFamily="49" charset="0"/>
+              </a:rPr>
+              <a:t>1:10 %&gt;% </a:t>
+            </a:r>
+            <a:r>
+              <a:rPr lang="en-US" sz="1600" dirty="0" err="1">
+                <a:latin typeface="Lucida Console" panose="020B0609040504020204" pitchFamily="49" charset="0"/>
+              </a:rPr>
+              <a:t>lapply</a:t>
+            </a:r>
+            <a:r>
+              <a:rPr lang="en-US" sz="1600" dirty="0">
+                <a:latin typeface="Lucida Console" panose="020B0609040504020204" pitchFamily="49" charset="0"/>
+              </a:rPr>
+              <a:t>(sqrt)</a:t>
+            </a:r>
+          </a:p>
+          <a:p>
+            <a:endParaRPr lang="en-US" dirty="0"/>
+          </a:p>
+          <a:p>
+            <a:r>
+              <a:rPr lang="en-US" dirty="0" err="1"/>
+              <a:t>mapply</a:t>
+            </a:r>
+            <a:r>
+              <a:rPr lang="en-US" dirty="0"/>
+              <a:t>() (multivariate apply): When you need additional arguments passed</a:t>
+            </a:r>
+          </a:p>
+          <a:p>
+            <a:r>
+              <a:rPr lang="en-US" dirty="0"/>
+              <a:t>Example: </a:t>
+            </a:r>
+            <a:r>
+              <a:rPr lang="en-US" sz="1600" dirty="0" err="1">
+                <a:latin typeface="Lucida Console" panose="020B0609040504020204" pitchFamily="49" charset="0"/>
+              </a:rPr>
+              <a:t>mapply</a:t>
+            </a:r>
+            <a:r>
+              <a:rPr lang="en-US" sz="1600" dirty="0">
+                <a:latin typeface="Lucida Console" panose="020B0609040504020204" pitchFamily="49" charset="0"/>
+              </a:rPr>
+              <a:t>(rep, times = 1:10, x = 1:5, each = 2)</a:t>
+            </a:r>
+          </a:p>
+          <a:p>
+            <a:pPr>
+              <a:buNone/>
+            </a:pPr>
+            <a:endParaRPr lang="en-US" dirty="0"/>
+          </a:p>
+          <a:p>
+            <a:pPr>
+              <a:buNone/>
+            </a:pPr>
+            <a:r>
+              <a:rPr lang="en-US" dirty="0"/>
+              <a:t>Others: </a:t>
+            </a:r>
+            <a:r>
+              <a:rPr lang="en-US" dirty="0" err="1"/>
+              <a:t>vapply</a:t>
+            </a:r>
+            <a:r>
+              <a:rPr lang="en-US" dirty="0"/>
+              <a:t> (when you need a specific type return), </a:t>
+            </a:r>
+            <a:r>
+              <a:rPr lang="en-US" dirty="0" err="1"/>
+              <a:t>tapply</a:t>
+            </a:r>
+            <a:r>
+              <a:rPr lang="en-US" dirty="0"/>
+              <a:t> (something with factors)</a:t>
+            </a:r>
+          </a:p>
+          <a:p>
+            <a:endParaRPr lang="en-US" dirty="0"/>
+          </a:p>
+        </p:txBody>
+      </p:sp>
+      <p:sp>
+        <p:nvSpPr>
+          <p:cNvPr id="4" name="Date Placeholder 3">
+            <a:extLst>
+              <a:ext uri="{FF2B5EF4-FFF2-40B4-BE49-F238E27FC236}">
+                <a16:creationId xmlns:a16="http://schemas.microsoft.com/office/drawing/2014/main" id="{20CE8A1E-57A4-B9A4-35B4-71644382868B}"/>
+              </a:ext>
+            </a:extLst>
+          </p:cNvPr>
+          <p:cNvSpPr>
+            <a:spLocks noGrp="1"/>
+          </p:cNvSpPr>
+          <p:nvPr>
+            <p:ph type="dt" sz="half" idx="10"/>
+          </p:nvPr>
+        </p:nvSpPr>
+        <p:spPr/>
+        <p:txBody>
+          <a:bodyPr/>
+          <a:lstStyle/>
+          <a:p>
+            <a:fld id="{527D860E-4AA8-43CC-B3E9-353006A6F547}" type="datetime1">
+              <a:rPr lang="en-GB" smtClean="0"/>
+              <a:t>21/11/2023</a:t>
+            </a:fld>
+            <a:r>
+              <a:rPr lang="en-GB"/>
+              <a:t>07/11/2023</a:t>
+            </a:r>
+            <a:endParaRPr lang="en-GB" dirty="0"/>
+          </a:p>
+        </p:txBody>
+      </p:sp>
+    </p:spTree>
+    <p:extLst>
+      <p:ext uri="{BB962C8B-B14F-4D97-AF65-F5344CB8AC3E}">
+        <p14:creationId xmlns:p14="http://schemas.microsoft.com/office/powerpoint/2010/main" val="2550746187"/>
+      </p:ext>
+    </p:extLst>
+  </p:cSld>
+  <p:clrMapOvr>
+    <a:masterClrMapping/>
+  </p:clrMapOvr>
+  <p:timing>
+    <p:tnLst>
+      <p:par>
+        <p:cTn id="1" dur="indefinite" restart="never" nodeType="tmRoot">
+          <p:childTnLst>
+            <p:seq concurrent="1" nextAc="seek">
+              <p:cTn id="2" dur="indefinite" nodeType="mainSeq">
+                <p:childTnLst>
+                  <p:par>
+                    <p:cTn id="3" fill="hold">
+                      <p:stCondLst>
+                        <p:cond delay="indefinite"/>
+                      </p:stCondLst>
+                      <p:childTnLst>
+                        <p:par>
+                          <p:cTn id="4" fill="hold">
+                            <p:stCondLst>
+                              <p:cond delay="0"/>
+                            </p:stCondLst>
+                            <p:childTnLst>
+                              <p:par>
+                                <p:cTn id="5" presetID="1" presetClass="entr" presetSubtype="0" fill="hold" nodeType="clickEffect">
+                                  <p:stCondLst>
+                                    <p:cond delay="0"/>
+                                  </p:stCondLst>
+                                  <p:childTnLst>
+                                    <p:set>
+                                      <p:cBhvr>
+                                        <p:cTn id="6" dur="1" fill="hold">
+                                          <p:stCondLst>
+                                            <p:cond delay="0"/>
+                                          </p:stCondLst>
+                                        </p:cTn>
+                                        <p:tgtEl>
+                                          <p:spTgt spid="3">
+                                            <p:txEl>
+                                              <p:pRg st="3" end="3"/>
+                                            </p:txEl>
+                                          </p:spTgt>
+                                        </p:tgtEl>
+                                        <p:attrNameLst>
+                                          <p:attrName>style.visibility</p:attrName>
+                                        </p:attrNameLst>
+                                      </p:cBhvr>
+                                      <p:to>
+                                        <p:strVal val="visible"/>
+                                      </p:to>
+                                    </p:set>
+                                  </p:childTnLst>
+                                </p:cTn>
+                              </p:par>
+                              <p:par>
+                                <p:cTn id="7" presetID="1" presetClass="entr" presetSubtype="0" fill="hold" nodeType="withEffect">
+                                  <p:stCondLst>
+                                    <p:cond delay="0"/>
+                                  </p:stCondLst>
+                                  <p:childTnLst>
+                                    <p:set>
+                                      <p:cBhvr>
+                                        <p:cTn id="8" dur="1" fill="hold">
+                                          <p:stCondLst>
+                                            <p:cond delay="0"/>
+                                          </p:stCondLst>
+                                        </p:cTn>
+                                        <p:tgtEl>
+                                          <p:spTgt spid="3">
+                                            <p:txEl>
+                                              <p:pRg st="4" end="4"/>
+                                            </p:txEl>
+                                          </p:spTgt>
+                                        </p:tgtEl>
+                                        <p:attrNameLst>
+                                          <p:attrName>style.visibility</p:attrName>
+                                        </p:attrNameLst>
+                                      </p:cBhvr>
+                                      <p:to>
+                                        <p:strVal val="visible"/>
+                                      </p:to>
+                                    </p:set>
+                                  </p:childTnLst>
+                                </p:cTn>
+                              </p:par>
+                            </p:childTnLst>
+                          </p:cTn>
+                        </p:par>
+                      </p:childTnLst>
+                    </p:cTn>
+                  </p:par>
+                  <p:par>
+                    <p:cTn id="9" fill="hold">
+                      <p:stCondLst>
+                        <p:cond delay="indefinite"/>
+                      </p:stCondLst>
+                      <p:childTnLst>
+                        <p:par>
+                          <p:cTn id="10" fill="hold">
+                            <p:stCondLst>
+                              <p:cond delay="0"/>
+                            </p:stCondLst>
+                            <p:childTnLst>
+                              <p:par>
+                                <p:cTn id="11" presetID="1" presetClass="entr" presetSubtype="0" fill="hold" nodeType="clickEffect">
+                                  <p:stCondLst>
+                                    <p:cond delay="0"/>
+                                  </p:stCondLst>
+                                  <p:childTnLst>
+                                    <p:set>
+                                      <p:cBhvr>
+                                        <p:cTn id="12" dur="1" fill="hold">
+                                          <p:stCondLst>
+                                            <p:cond delay="0"/>
+                                          </p:stCondLst>
+                                        </p:cTn>
+                                        <p:tgtEl>
+                                          <p:spTgt spid="3">
+                                            <p:txEl>
+                                              <p:pRg st="6" end="6"/>
+                                            </p:txEl>
+                                          </p:spTgt>
+                                        </p:tgtEl>
+                                        <p:attrNameLst>
+                                          <p:attrName>style.visibility</p:attrName>
+                                        </p:attrNameLst>
+                                      </p:cBhvr>
+                                      <p:to>
+                                        <p:strVal val="visible"/>
+                                      </p:to>
+                                    </p:set>
+                                  </p:childTnLst>
+                                </p:cTn>
+                              </p:par>
+                              <p:par>
+                                <p:cTn id="13" presetID="1" presetClass="entr" presetSubtype="0" fill="hold" nodeType="withEffect">
+                                  <p:stCondLst>
+                                    <p:cond delay="0"/>
+                                  </p:stCondLst>
+                                  <p:childTnLst>
+                                    <p:set>
+                                      <p:cBhvr>
+                                        <p:cTn id="14" dur="1" fill="hold">
+                                          <p:stCondLst>
+                                            <p:cond delay="0"/>
+                                          </p:stCondLst>
+                                        </p:cTn>
+                                        <p:tgtEl>
+                                          <p:spTgt spid="3">
+                                            <p:txEl>
+                                              <p:pRg st="7" end="7"/>
+                                            </p:txEl>
+                                          </p:spTgt>
+                                        </p:tgtEl>
+                                        <p:attrNameLst>
+                                          <p:attrName>style.visibility</p:attrName>
+                                        </p:attrNameLst>
+                                      </p:cBhvr>
+                                      <p:to>
+                                        <p:strVal val="visible"/>
+                                      </p:to>
+                                    </p:set>
+                                  </p:childTnLst>
+                                </p:cTn>
+                              </p:par>
+                            </p:childTnLst>
+                          </p:cTn>
+                        </p:par>
+                      </p:childTnLst>
+                    </p:cTn>
+                  </p:par>
+                  <p:par>
+                    <p:cTn id="15" fill="hold">
+                      <p:stCondLst>
+                        <p:cond delay="indefinite"/>
+                      </p:stCondLst>
+                      <p:childTnLst>
+                        <p:par>
+                          <p:cTn id="16" fill="hold">
+                            <p:stCondLst>
+                              <p:cond delay="0"/>
+                            </p:stCondLst>
+                            <p:childTnLst>
+                              <p:par>
+                                <p:cTn id="17" presetID="1" presetClass="entr" presetSubtype="0" fill="hold" nodeType="clickEffect">
+                                  <p:stCondLst>
+                                    <p:cond delay="0"/>
+                                  </p:stCondLst>
+                                  <p:childTnLst>
+                                    <p:set>
+                                      <p:cBhvr>
+                                        <p:cTn id="18" dur="1" fill="hold">
+                                          <p:stCondLst>
+                                            <p:cond delay="0"/>
+                                          </p:stCondLst>
+                                        </p:cTn>
+                                        <p:tgtEl>
+                                          <p:spTgt spid="3">
+                                            <p:txEl>
+                                              <p:pRg st="9" end="9"/>
+                                            </p:txEl>
+                                          </p:spTgt>
+                                        </p:tgtEl>
+                                        <p:attrNameLst>
+                                          <p:attrName>style.visibility</p:attrName>
+                                        </p:attrNameLst>
+                                      </p:cBhvr>
+                                      <p:to>
+                                        <p:strVal val="visible"/>
+                                      </p:to>
+                                    </p:set>
+                                  </p:childTnLst>
+                                </p:cTn>
+                              </p:par>
+                              <p:par>
+                                <p:cTn id="19" presetID="1" presetClass="entr" presetSubtype="0" fill="hold" nodeType="withEffect">
+                                  <p:stCondLst>
+                                    <p:cond delay="0"/>
+                                  </p:stCondLst>
+                                  <p:childTnLst>
+                                    <p:set>
+                                      <p:cBhvr>
+                                        <p:cTn id="20" dur="1" fill="hold">
+                                          <p:stCondLst>
+                                            <p:cond delay="0"/>
+                                          </p:stCondLst>
+                                        </p:cTn>
+                                        <p:tgtEl>
+                                          <p:spTgt spid="3">
+                                            <p:txEl>
+                                              <p:pRg st="10" end="10"/>
+                                            </p:txEl>
+                                          </p:spTgt>
+                                        </p:tgtEl>
+                                        <p:attrNameLst>
+                                          <p:attrName>style.visibility</p:attrName>
+                                        </p:attrNameLst>
+                                      </p:cBhvr>
+                                      <p:to>
+                                        <p:strVal val="visible"/>
+                                      </p:to>
+                                    </p:set>
+                                  </p:childTnLst>
+                                </p:cTn>
+                              </p:par>
+                              <p:par>
+                                <p:cTn id="21" presetID="1" presetClass="entr" presetSubtype="0" fill="hold" nodeType="withEffect">
+                                  <p:stCondLst>
+                                    <p:cond delay="0"/>
+                                  </p:stCondLst>
+                                  <p:childTnLst>
+                                    <p:set>
+                                      <p:cBhvr>
+                                        <p:cTn id="22" dur="1" fill="hold">
+                                          <p:stCondLst>
+                                            <p:cond delay="0"/>
+                                          </p:stCondLst>
+                                        </p:cTn>
+                                        <p:tgtEl>
+                                          <p:spTgt spid="3">
+                                            <p:txEl>
+                                              <p:pRg st="12" end="12"/>
+                                            </p:txEl>
+                                          </p:spTgt>
+                                        </p:tgtEl>
+                                        <p:attrNameLst>
+                                          <p:attrName>style.visibility</p:attrName>
+                                        </p:attrNameLst>
+                                      </p:cBhvr>
+                                      <p:to>
+                                        <p:strVal val="visible"/>
+                                      </p:to>
+                                    </p:set>
+                                  </p:childTnLst>
+                                </p:cTn>
+                              </p:par>
+                            </p:childTnLst>
+                          </p:cTn>
+                        </p:par>
+                      </p:childTnLst>
+                    </p:cTn>
+                  </p:par>
+                </p:childTnLst>
+              </p:cTn>
+              <p:prevCondLst>
+                <p:cond evt="onPrev" delay="0">
+                  <p:tgtEl>
+                    <p:sldTgt/>
+                  </p:tgtEl>
+                </p:cond>
+              </p:prevCondLst>
+              <p:nextCondLst>
+                <p:cond evt="onNext" delay="0">
+                  <p:tgtEl>
+                    <p:sldTgt/>
+                  </p:tgtEl>
+                </p:cond>
+              </p:nextCondLst>
+            </p:seq>
+          </p:childTnLst>
+        </p:cTn>
+      </p:par>
+    </p:tnLst>
+  </p:timing>
+</p:sld>
+</file>
+
+<file path=ppt/slides/slide18.xml><?xml version="1.0" encoding="utf-8"?>
+<p:sld xmlns:a="http://schemas.openxmlformats.org/drawingml/2006/main" xmlns:r="http://schemas.openxmlformats.org/officeDocument/2006/relationships" xmlns:p="http://schemas.openxmlformats.org/presentationml/2006/main">
+  <p:cSld>
+    <p:spTree>
+      <p:nvGrpSpPr>
+        <p:cNvPr id="1" name=""/>
+        <p:cNvGrpSpPr/>
+        <p:nvPr/>
+      </p:nvGrpSpPr>
+      <p:grpSpPr>
+        <a:xfrm>
+          <a:off x="0" y="0"/>
+          <a:ext cx="0" cy="0"/>
+          <a:chOff x="0" y="0"/>
+          <a:chExt cx="0" cy="0"/>
+        </a:xfrm>
+      </p:grpSpPr>
+      <p:sp>
+        <p:nvSpPr>
+          <p:cNvPr id="2" name="Title 1">
+            <a:extLst>
+              <a:ext uri="{FF2B5EF4-FFF2-40B4-BE49-F238E27FC236}">
                 <a16:creationId xmlns:a16="http://schemas.microsoft.com/office/drawing/2014/main" id="{8198E2B0-6F49-F1DF-2E4D-7A469B1D2E3C}"/>
               </a:ext>
             </a:extLst>
@@ -12841,7 +13924,7 @@
           <a:p>
             <a:fld id="{638DA670-DA22-4F3D-8A0F-EFE97634B4C8}" type="datetime1">
               <a:rPr lang="en-GB" smtClean="0"/>
-              <a:t>20/11/2023</a:t>
+              <a:t>21/11/2023</a:t>
             </a:fld>
             <a:r>
               <a:rPr lang="en-GB" dirty="0"/>
@@ -13457,7 +14540,7 @@
             </a:pPr>
             <a:r>
               <a:rPr lang="en-US" dirty="0"/>
-              <a:t>Define a function using the function() keyword.</a:t>
+              <a:t>Defined by using the function() keyword.</a:t>
             </a:r>
           </a:p>
           <a:p>
@@ -13585,11 +14668,159 @@
           <a:p>
             <a:fld id="{0C91B5C9-0F94-46DE-A64F-0C7DD4CD84FB}" type="datetime1">
               <a:rPr lang="en-GB" smtClean="0"/>
-              <a:t>20/11/2023</a:t>
+              <a:t>21/11/2023</a:t>
             </a:fld>
             <a:r>
               <a:rPr lang="en-GB" dirty="0"/>
               <a:t>07/11/2023</a:t>
+            </a:r>
+          </a:p>
+        </p:txBody>
+      </p:sp>
+      <p:sp>
+        <p:nvSpPr>
+          <p:cNvPr id="7" name="TextBox 6">
+            <a:extLst>
+              <a:ext uri="{FF2B5EF4-FFF2-40B4-BE49-F238E27FC236}">
+                <a16:creationId xmlns:a16="http://schemas.microsoft.com/office/drawing/2014/main" id="{B11CE1E9-F844-4634-1938-D7B5DDEB6707}"/>
+              </a:ext>
+            </a:extLst>
+          </p:cNvPr>
+          <p:cNvSpPr txBox="1"/>
+          <p:nvPr/>
+        </p:nvSpPr>
+        <p:spPr>
+          <a:xfrm>
+            <a:off x="6526460" y="5381352"/>
+            <a:ext cx="4032448" cy="701731"/>
+          </a:xfrm>
+          <a:prstGeom prst="rect">
+            <a:avLst/>
+          </a:prstGeom>
+          <a:noFill/>
+        </p:spPr>
+        <p:txBody>
+          <a:bodyPr wrap="square" lIns="0" tIns="0" rIns="0" bIns="0" rtlCol="0">
+            <a:spAutoFit/>
+          </a:bodyPr>
+          <a:lstStyle/>
+          <a:p>
+            <a:pPr>
+              <a:lnSpc>
+                <a:spcPct val="95000"/>
+              </a:lnSpc>
+            </a:pPr>
+            <a:r>
+              <a:rPr lang="en-US" sz="1600" dirty="0" err="1">
+                <a:latin typeface="Lucida Console" panose="020B0609040504020204" pitchFamily="49" charset="0"/>
+              </a:rPr>
+              <a:t>addNumbers</a:t>
+            </a:r>
+            <a:r>
+              <a:rPr lang="en-US" sz="1600" dirty="0">
+                <a:latin typeface="Lucida Console" panose="020B0609040504020204" pitchFamily="49" charset="0"/>
+              </a:rPr>
+              <a:t> = function(a, b) {</a:t>
+            </a:r>
+          </a:p>
+          <a:p>
+            <a:pPr>
+              <a:lnSpc>
+                <a:spcPct val="95000"/>
+              </a:lnSpc>
+            </a:pPr>
+            <a:r>
+              <a:rPr lang="en-US" sz="1600" dirty="0">
+                <a:latin typeface="Lucida Console" panose="020B0609040504020204" pitchFamily="49" charset="0"/>
+              </a:rPr>
+              <a:t>  a + b</a:t>
+            </a:r>
+          </a:p>
+          <a:p>
+            <a:pPr>
+              <a:lnSpc>
+                <a:spcPct val="95000"/>
+              </a:lnSpc>
+            </a:pPr>
+            <a:r>
+              <a:rPr lang="en-US" sz="1600" dirty="0">
+                <a:latin typeface="Lucida Console" panose="020B0609040504020204" pitchFamily="49" charset="0"/>
+              </a:rPr>
+              <a:t>}</a:t>
+            </a:r>
+          </a:p>
+        </p:txBody>
+      </p:sp>
+      <p:sp>
+        <p:nvSpPr>
+          <p:cNvPr id="8" name="TextBox 7">
+            <a:extLst>
+              <a:ext uri="{FF2B5EF4-FFF2-40B4-BE49-F238E27FC236}">
+                <a16:creationId xmlns:a16="http://schemas.microsoft.com/office/drawing/2014/main" id="{5F4F2728-9E6D-810B-5536-462AD980A057}"/>
+              </a:ext>
+            </a:extLst>
+          </p:cNvPr>
+          <p:cNvSpPr txBox="1"/>
+          <p:nvPr/>
+        </p:nvSpPr>
+        <p:spPr>
+          <a:xfrm>
+            <a:off x="5662364" y="4667035"/>
+            <a:ext cx="4032448" cy="701731"/>
+          </a:xfrm>
+          <a:prstGeom prst="rect">
+            <a:avLst/>
+          </a:prstGeom>
+          <a:noFill/>
+        </p:spPr>
+        <p:txBody>
+          <a:bodyPr wrap="square" lIns="0" tIns="0" rIns="0" bIns="0" rtlCol="0">
+            <a:spAutoFit/>
+          </a:bodyPr>
+          <a:lstStyle/>
+          <a:p>
+            <a:pPr>
+              <a:lnSpc>
+                <a:spcPct val="95000"/>
+              </a:lnSpc>
+            </a:pPr>
+            <a:r>
+              <a:rPr lang="en-US" sz="1600" dirty="0" err="1">
+                <a:latin typeface="Lucida Console" panose="020B0609040504020204" pitchFamily="49" charset="0"/>
+              </a:rPr>
+              <a:t>addNumbers</a:t>
+            </a:r>
+            <a:r>
+              <a:rPr lang="en-US" sz="1600" dirty="0">
+                <a:latin typeface="Lucida Console" panose="020B0609040504020204" pitchFamily="49" charset="0"/>
+              </a:rPr>
+              <a:t> = function(a, b) {</a:t>
+            </a:r>
+          </a:p>
+          <a:p>
+            <a:pPr>
+              <a:lnSpc>
+                <a:spcPct val="95000"/>
+              </a:lnSpc>
+            </a:pPr>
+            <a:r>
+              <a:rPr lang="en-US" sz="1600" dirty="0">
+                <a:latin typeface="Lucida Console" panose="020B0609040504020204" pitchFamily="49" charset="0"/>
+              </a:rPr>
+              <a:t>  return(a + b)</a:t>
+            </a:r>
+          </a:p>
+          <a:p>
+            <a:pPr>
+              <a:lnSpc>
+                <a:spcPct val="95000"/>
+              </a:lnSpc>
+            </a:pPr>
+            <a:r>
+              <a:rPr lang="en-US" sz="1600" dirty="0">
+                <a:latin typeface="Lucida Console" panose="020B0609040504020204" pitchFamily="49" charset="0"/>
+              </a:rPr>
+              <a:t>}</a:t>
             </a:r>
           </a:p>
         </p:txBody>
@@ -13785,6 +15016,78 @@
                       </p:childTnLst>
                     </p:cTn>
                   </p:par>
+                  <p:par>
+                    <p:cTn id="15" fill="hold">
+                      <p:stCondLst>
+                        <p:cond delay="indefinite"/>
+                      </p:stCondLst>
+                      <p:childTnLst>
+                        <p:par>
+                          <p:cTn id="16" fill="hold">
+                            <p:stCondLst>
+                              <p:cond delay="0"/>
+                            </p:stCondLst>
+                            <p:childTnLst>
+                              <p:par>
+                                <p:cTn id="17" presetID="1" presetClass="entr" presetSubtype="0" fill="hold" grpId="0" nodeType="clickEffect">
+                                  <p:stCondLst>
+                                    <p:cond delay="0"/>
+                                  </p:stCondLst>
+                                  <p:childTnLst>
+                                    <p:set>
+                                      <p:cBhvr>
+                                        <p:cTn id="18" dur="1" fill="hold">
+                                          <p:stCondLst>
+                                            <p:cond delay="0"/>
+                                          </p:stCondLst>
+                                        </p:cTn>
+                                        <p:tgtEl>
+                                          <p:spTgt spid="7"/>
+                                        </p:tgtEl>
+                                        <p:attrNameLst>
+                                          <p:attrName>style.visibility</p:attrName>
+                                        </p:attrNameLst>
+                                      </p:cBhvr>
+                                      <p:to>
+                                        <p:strVal val="visible"/>
+                                      </p:to>
+                                    </p:set>
+                                  </p:childTnLst>
+                                </p:cTn>
+                              </p:par>
+                              <p:par>
+                                <p:cTn id="19" presetID="1" presetClass="entr" presetSubtype="0" fill="hold" grpId="0" nodeType="withEffect">
+                                  <p:stCondLst>
+                                    <p:cond delay="0"/>
+                                  </p:stCondLst>
+                                  <p:childTnLst>
+                                    <p:set>
+                                      <p:cBhvr>
+                                        <p:cTn id="20" dur="1" fill="hold">
+                                          <p:stCondLst>
+                                            <p:cond delay="0"/>
+                                          </p:stCondLst>
+                                        </p:cTn>
+                                        <p:tgtEl>
+                                          <p:spTgt spid="8"/>
+                                        </p:tgtEl>
+                                        <p:attrNameLst>
+                                          <p:attrName>style.visibility</p:attrName>
+                                        </p:attrNameLst>
+                                      </p:cBhvr>
+                                      <p:to>
+                                        <p:strVal val="visible"/>
+                                      </p:to>
+                                    </p:set>
+                                  </p:childTnLst>
+                                </p:cTn>
+                              </p:par>
+                            </p:childTnLst>
+                          </p:cTn>
+                        </p:par>
+                      </p:childTnLst>
+                    </p:cTn>
+                  </p:par>
                 </p:childTnLst>
               </p:cTn>
               <p:prevCondLst>
@@ -13806,6 +15109,10 @@
         </p:cTn>
       </p:par>
     </p:tnLst>
+    <p:bldLst>
+      <p:bldP spid="7" grpId="0"/>
+      <p:bldP spid="8" grpId="0"/>
+    </p:bldLst>
   </p:timing>
 </p:sld>
 </file>
@@ -13986,6 +15293,14 @@
               <a:rPr lang="en-US" sz="1600" dirty="0">
                 <a:latin typeface="Lucida Console" panose="020B0609040504020204" pitchFamily="49" charset="0"/>
               </a:rPr>
+              <a:t>  x = 5</a:t>
+            </a:r>
+          </a:p>
+          <a:p>
+            <a:r>
+              <a:rPr lang="en-US" sz="1600" dirty="0">
+                <a:latin typeface="Lucida Console" panose="020B0609040504020204" pitchFamily="49" charset="0"/>
+              </a:rPr>
               <a:t>  return(y * x)</a:t>
             </a:r>
           </a:p>
@@ -14028,7 +15343,7 @@
           <a:p>
             <a:fld id="{692C0F53-02D9-4815-9CC7-9DECF82B74E8}" type="datetime1">
               <a:rPr lang="en-GB" smtClean="0"/>
-              <a:t>20/11/2023</a:t>
+              <a:t>21/11/2023</a:t>
             </a:fld>
             <a:r>
               <a:rPr lang="en-GB"/>
@@ -14154,7 +15469,7 @@
           <a:p>
             <a:fld id="{00DC5981-5044-4AF7-B2BD-813E3BC017AE}" type="datetime1">
               <a:rPr lang="en-GB" smtClean="0"/>
-              <a:t>20/11/2023</a:t>
+              <a:t>21/11/2023</a:t>
             </a:fld>
             <a:r>
               <a:rPr lang="en-GB"/>
@@ -16555,313 +17870,6 @@
   <p:clrMapOvr>
     <a:masterClrMapping/>
   </p:clrMapOvr>
-  <p:timing>
-    <p:tnLst>
-      <p:par>
-        <p:cTn id="1" dur="indefinite" restart="never" nodeType="tmRoot">
-          <p:childTnLst>
-            <p:seq concurrent="1" nextAc="seek">
-              <p:cTn id="2" dur="indefinite" nodeType="mainSeq">
-                <p:childTnLst>
-                  <p:par>
-                    <p:cTn id="3" fill="hold">
-                      <p:stCondLst>
-                        <p:cond delay="indefinite"/>
-                      </p:stCondLst>
-                      <p:childTnLst>
-                        <p:par>
-                          <p:cTn id="4" fill="hold">
-                            <p:stCondLst>
-                              <p:cond delay="0"/>
-                            </p:stCondLst>
-                            <p:childTnLst>
-                              <p:par>
-                                <p:cTn id="5" presetID="1" presetClass="entr" presetSubtype="0" fill="hold" grpId="0" nodeType="clickEffect">
-                                  <p:stCondLst>
-                                    <p:cond delay="0"/>
-                                  </p:stCondLst>
-                                  <p:childTnLst>
-                                    <p:set>
-                                      <p:cBhvr>
-                                        <p:cTn id="6" dur="1" fill="hold">
-                                          <p:stCondLst>
-                                            <p:cond delay="0"/>
-                                          </p:stCondLst>
-                                        </p:cTn>
-                                        <p:tgtEl>
-                                          <p:spTgt spid="11"/>
-                                        </p:tgtEl>
-                                        <p:attrNameLst>
-                                          <p:attrName>style.visibility</p:attrName>
-                                        </p:attrNameLst>
-                                      </p:cBhvr>
-                                      <p:to>
-                                        <p:strVal val="visible"/>
-                                      </p:to>
-                                    </p:set>
-                                  </p:childTnLst>
-                                </p:cTn>
-                              </p:par>
-                              <p:par>
-                                <p:cTn id="7" presetID="1" presetClass="entr" presetSubtype="0" fill="hold" nodeType="withEffect">
-                                  <p:stCondLst>
-                                    <p:cond delay="0"/>
-                                  </p:stCondLst>
-                                  <p:childTnLst>
-                                    <p:set>
-                                      <p:cBhvr>
-                                        <p:cTn id="8" dur="1" fill="hold">
-                                          <p:stCondLst>
-                                            <p:cond delay="0"/>
-                                          </p:stCondLst>
-                                        </p:cTn>
-                                        <p:tgtEl>
-                                          <p:spTgt spid="14"/>
-                                        </p:tgtEl>
-                                        <p:attrNameLst>
-                                          <p:attrName>style.visibility</p:attrName>
-                                        </p:attrNameLst>
-                                      </p:cBhvr>
-                                      <p:to>
-                                        <p:strVal val="visible"/>
-                                      </p:to>
-                                    </p:set>
-                                  </p:childTnLst>
-                                </p:cTn>
-                              </p:par>
-                              <p:par>
-                                <p:cTn id="9" presetID="1" presetClass="entr" presetSubtype="0" fill="hold" grpId="0" nodeType="withEffect">
-                                  <p:stCondLst>
-                                    <p:cond delay="0"/>
-                                  </p:stCondLst>
-                                  <p:childTnLst>
-                                    <p:set>
-                                      <p:cBhvr>
-                                        <p:cTn id="10" dur="1" fill="hold">
-                                          <p:stCondLst>
-                                            <p:cond delay="0"/>
-                                          </p:stCondLst>
-                                        </p:cTn>
-                                        <p:tgtEl>
-                                          <p:spTgt spid="10"/>
-                                        </p:tgtEl>
-                                        <p:attrNameLst>
-                                          <p:attrName>style.visibility</p:attrName>
-                                        </p:attrNameLst>
-                                      </p:cBhvr>
-                                      <p:to>
-                                        <p:strVal val="visible"/>
-                                      </p:to>
-                                    </p:set>
-                                  </p:childTnLst>
-                                </p:cTn>
-                              </p:par>
-                              <p:par>
-                                <p:cTn id="11" presetID="1" presetClass="entr" presetSubtype="0" fill="hold" grpId="0" nodeType="withEffect">
-                                  <p:stCondLst>
-                                    <p:cond delay="0"/>
-                                  </p:stCondLst>
-                                  <p:childTnLst>
-                                    <p:set>
-                                      <p:cBhvr>
-                                        <p:cTn id="12" dur="1" fill="hold">
-                                          <p:stCondLst>
-                                            <p:cond delay="0"/>
-                                          </p:stCondLst>
-                                        </p:cTn>
-                                        <p:tgtEl>
-                                          <p:spTgt spid="19"/>
-                                        </p:tgtEl>
-                                        <p:attrNameLst>
-                                          <p:attrName>style.visibility</p:attrName>
-                                        </p:attrNameLst>
-                                      </p:cBhvr>
-                                      <p:to>
-                                        <p:strVal val="visible"/>
-                                      </p:to>
-                                    </p:set>
-                                  </p:childTnLst>
-                                </p:cTn>
-                              </p:par>
-                            </p:childTnLst>
-                          </p:cTn>
-                        </p:par>
-                      </p:childTnLst>
-                    </p:cTn>
-                  </p:par>
-                  <p:par>
-                    <p:cTn id="13" fill="hold">
-                      <p:stCondLst>
-                        <p:cond delay="indefinite"/>
-                      </p:stCondLst>
-                      <p:childTnLst>
-                        <p:par>
-                          <p:cTn id="14" fill="hold">
-                            <p:stCondLst>
-                              <p:cond delay="0"/>
-                            </p:stCondLst>
-                            <p:childTnLst>
-                              <p:par>
-                                <p:cTn id="15" presetID="1" presetClass="entr" presetSubtype="0" fill="hold" grpId="0" nodeType="clickEffect">
-                                  <p:stCondLst>
-                                    <p:cond delay="0"/>
-                                  </p:stCondLst>
-                                  <p:childTnLst>
-                                    <p:set>
-                                      <p:cBhvr>
-                                        <p:cTn id="16" dur="1" fill="hold">
-                                          <p:stCondLst>
-                                            <p:cond delay="0"/>
-                                          </p:stCondLst>
-                                        </p:cTn>
-                                        <p:tgtEl>
-                                          <p:spTgt spid="27"/>
-                                        </p:tgtEl>
-                                        <p:attrNameLst>
-                                          <p:attrName>style.visibility</p:attrName>
-                                        </p:attrNameLst>
-                                      </p:cBhvr>
-                                      <p:to>
-                                        <p:strVal val="visible"/>
-                                      </p:to>
-                                    </p:set>
-                                  </p:childTnLst>
-                                </p:cTn>
-                              </p:par>
-                              <p:par>
-                                <p:cTn id="17" presetID="1" presetClass="entr" presetSubtype="0" fill="hold" nodeType="withEffect">
-                                  <p:stCondLst>
-                                    <p:cond delay="0"/>
-                                  </p:stCondLst>
-                                  <p:childTnLst>
-                                    <p:set>
-                                      <p:cBhvr>
-                                        <p:cTn id="18" dur="1" fill="hold">
-                                          <p:stCondLst>
-                                            <p:cond delay="0"/>
-                                          </p:stCondLst>
-                                        </p:cTn>
-                                        <p:tgtEl>
-                                          <p:spTgt spid="29"/>
-                                        </p:tgtEl>
-                                        <p:attrNameLst>
-                                          <p:attrName>style.visibility</p:attrName>
-                                        </p:attrNameLst>
-                                      </p:cBhvr>
-                                      <p:to>
-                                        <p:strVal val="visible"/>
-                                      </p:to>
-                                    </p:set>
-                                  </p:childTnLst>
-                                </p:cTn>
-                              </p:par>
-                              <p:par>
-                                <p:cTn id="19" presetID="1" presetClass="entr" presetSubtype="0" fill="hold" grpId="0" nodeType="withEffect">
-                                  <p:stCondLst>
-                                    <p:cond delay="0"/>
-                                  </p:stCondLst>
-                                  <p:childTnLst>
-                                    <p:set>
-                                      <p:cBhvr>
-                                        <p:cTn id="20" dur="1" fill="hold">
-                                          <p:stCondLst>
-                                            <p:cond delay="0"/>
-                                          </p:stCondLst>
-                                        </p:cTn>
-                                        <p:tgtEl>
-                                          <p:spTgt spid="28"/>
-                                        </p:tgtEl>
-                                        <p:attrNameLst>
-                                          <p:attrName>style.visibility</p:attrName>
-                                        </p:attrNameLst>
-                                      </p:cBhvr>
-                                      <p:to>
-                                        <p:strVal val="visible"/>
-                                      </p:to>
-                                    </p:set>
-                                  </p:childTnLst>
-                                </p:cTn>
-                              </p:par>
-                            </p:childTnLst>
-                          </p:cTn>
-                        </p:par>
-                      </p:childTnLst>
-                    </p:cTn>
-                  </p:par>
-                  <p:par>
-                    <p:cTn id="21" fill="hold">
-                      <p:stCondLst>
-                        <p:cond delay="indefinite"/>
-                      </p:stCondLst>
-                      <p:childTnLst>
-                        <p:par>
-                          <p:cTn id="22" fill="hold">
-                            <p:stCondLst>
-                              <p:cond delay="0"/>
-                            </p:stCondLst>
-                            <p:childTnLst>
-                              <p:par>
-                                <p:cTn id="23" presetID="1" presetClass="entr" presetSubtype="0" fill="hold" nodeType="clickEffect">
-                                  <p:stCondLst>
-                                    <p:cond delay="0"/>
-                                  </p:stCondLst>
-                                  <p:childTnLst>
-                                    <p:set>
-                                      <p:cBhvr>
-                                        <p:cTn id="24" dur="1" fill="hold">
-                                          <p:stCondLst>
-                                            <p:cond delay="0"/>
-                                          </p:stCondLst>
-                                        </p:cTn>
-                                        <p:tgtEl>
-                                          <p:spTgt spid="15"/>
-                                        </p:tgtEl>
-                                        <p:attrNameLst>
-                                          <p:attrName>style.visibility</p:attrName>
-                                        </p:attrNameLst>
-                                      </p:cBhvr>
-                                      <p:to>
-                                        <p:strVal val="visible"/>
-                                      </p:to>
-                                    </p:set>
-                                  </p:childTnLst>
-                                </p:cTn>
-                              </p:par>
-                            </p:childTnLst>
-                          </p:cTn>
-                        </p:par>
-                      </p:childTnLst>
-                    </p:cTn>
-                  </p:par>
-                </p:childTnLst>
-              </p:cTn>
-              <p:prevCondLst>
-                <p:cond evt="onPrev" delay="0">
-                  <p:tgtEl>
-                    <p:sldTgt/>
-                  </p:tgtEl>
-                </p:cond>
-              </p:prevCondLst>
-              <p:nextCondLst>
-                <p:cond evt="onNext" delay="0">
-                  <p:tgtEl>
-                    <p:sldTgt/>
-                  </p:tgtEl>
-                </p:cond>
-              </p:nextCondLst>
-            </p:seq>
-          </p:childTnLst>
-        </p:cTn>
-      </p:par>
-    </p:tnLst>
-    <p:bldLst>
-      <p:bldP spid="10" grpId="0" animBg="1"/>
-      <p:bldP spid="11" grpId="0"/>
-      <p:bldP spid="19" grpId="0"/>
-      <p:bldP spid="27" grpId="0"/>
-      <p:bldP spid="28" grpId="0" animBg="1"/>
-    </p:bldLst>
-  </p:timing>
 </p:sld>
 </file>
 
@@ -17162,7 +18170,7 @@
           <a:p>
             <a:fld id="{6F7AC461-7DEB-4575-B8CD-FDEB0FD499FF}" type="datetime1">
               <a:rPr lang="en-GB" smtClean="0"/>
-              <a:t>20/11/2023</a:t>
+              <a:t>21/11/2023</a:t>
             </a:fld>
             <a:r>
               <a:rPr lang="en-GB"/>
@@ -17426,7 +18434,7 @@
           <a:p>
             <a:fld id="{5AFA7466-6441-46BB-9F12-E2CABB750CFD}" type="datetime1">
               <a:rPr lang="en-GB" smtClean="0"/>
-              <a:t>20/11/2023</a:t>
+              <a:t>21/11/2023</a:t>
             </a:fld>
             <a:r>
               <a:rPr lang="en-GB"/>
@@ -17571,7 +18579,7 @@
           <a:p>
             <a:fld id="{638DA670-DA22-4F3D-8A0F-EFE97634B4C8}" type="datetime1">
               <a:rPr lang="en-GB" smtClean="0"/>
-              <a:t>20/11/2023</a:t>
+              <a:t>21/11/2023</a:t>
             </a:fld>
             <a:r>
               <a:rPr lang="en-GB" dirty="0"/>
@@ -17860,7 +18868,7 @@
           <a:p>
             <a:fld id="{2C36074D-32E4-4605-9743-462993968EA3}" type="datetime1">
               <a:rPr lang="en-GB" smtClean="0"/>
-              <a:t>20/11/2023</a:t>
+              <a:t>21/11/2023</a:t>
             </a:fld>
             <a:r>
               <a:rPr lang="en-GB"/>

</xml_diff>